<commit_message>
Fixed note naming bug and changed default highlighting to 1 3 5 7
</commit_message>
<xml_diff>
--- a/Planning/Shredsheets 3 - Planning & System Design.pptx
+++ b/Planning/Shredsheets 3 - Planning & System Design.pptx
@@ -231,7 +231,7 @@
           <a:p>
             <a:fld id="{63884A91-BCDC-425A-B351-D935EBE10F49}" type="datetimeFigureOut">
               <a:rPr lang="en-US" smtClean="0"/>
-              <a:t>11/4/2021</a:t>
+              <a:t>11/7/2022</a:t>
             </a:fld>
             <a:endParaRPr lang="en-US"/>
           </a:p>
@@ -481,7 +481,7 @@
           <a:p>
             <a:fld id="{7A1FB2A7-F989-47E6-A62C-19587DCEDB0D}" type="datetimeFigureOut">
               <a:rPr lang="en-US" smtClean="0"/>
-              <a:t>11/2/2021</a:t>
+              <a:t>11/7/2022</a:t>
             </a:fld>
             <a:endParaRPr lang="en-US"/>
           </a:p>
@@ -775,7 +775,7 @@
           <a:p>
             <a:fld id="{305FF9FF-DCA2-400E-87B0-C1580D9AF3CE}" type="datetimeFigureOut">
               <a:rPr lang="en-US" smtClean="0"/>
-              <a:t>11/2/2021</a:t>
+              <a:t>11/7/2022</a:t>
             </a:fld>
             <a:endParaRPr lang="en-US"/>
           </a:p>
@@ -1032,7 +1032,7 @@
           <a:p>
             <a:fld id="{7A1FB2A7-F989-47E6-A62C-19587DCEDB0D}" type="datetimeFigureOut">
               <a:rPr lang="en-US" smtClean="0"/>
-              <a:t>11/2/2021</a:t>
+              <a:t>11/7/2022</a:t>
             </a:fld>
             <a:endParaRPr lang="en-US"/>
           </a:p>
@@ -3330,10 +3330,10 @@
           </p:nvGrpSpPr>
           <p:grpSpPr>
             <a:xfrm>
-              <a:off x="5298420" y="2502476"/>
-              <a:ext cx="1914118" cy="2386725"/>
-              <a:chOff x="2285533" y="3732979"/>
-              <a:chExt cx="1914118" cy="2386725"/>
+              <a:off x="5322241" y="2502476"/>
+              <a:ext cx="1859242" cy="2386725"/>
+              <a:chOff x="2309354" y="3732979"/>
+              <a:chExt cx="1859242" cy="2386725"/>
             </a:xfrm>
           </p:grpSpPr>
           <p:grpSp>
@@ -3350,10 +3350,10 @@
             </p:nvGrpSpPr>
             <p:grpSpPr>
               <a:xfrm>
-                <a:off x="2285533" y="4345847"/>
-                <a:ext cx="1914118" cy="1128272"/>
-                <a:chOff x="2285533" y="4345847"/>
-                <a:chExt cx="1914118" cy="1128272"/>
+                <a:off x="2309354" y="4328177"/>
+                <a:ext cx="1859242" cy="1189109"/>
+                <a:chOff x="2309354" y="4328177"/>
+                <a:chExt cx="1859242" cy="1189109"/>
               </a:xfrm>
             </p:grpSpPr>
             <p:sp>
@@ -3426,8 +3426,8 @@
               </p:nvCxnSpPr>
               <p:spPr>
                 <a:xfrm flipH="1">
-                  <a:off x="2292651" y="4899441"/>
-                  <a:ext cx="1000675" cy="567666"/>
+                  <a:off x="2351487" y="4899441"/>
+                  <a:ext cx="941839" cy="617845"/>
                 </a:xfrm>
                 <a:prstGeom prst="line">
                   <a:avLst/>
@@ -3520,8 +3520,8 @@
               </p:nvCxnSpPr>
               <p:spPr>
                 <a:xfrm flipH="1" flipV="1">
-                  <a:off x="2285533" y="4403110"/>
-                  <a:ext cx="1007793" cy="496331"/>
+                  <a:off x="2309354" y="4328177"/>
+                  <a:ext cx="983972" cy="571264"/>
                 </a:xfrm>
                 <a:prstGeom prst="line">
                   <a:avLst/>
@@ -3568,7 +3568,7 @@
               <p:spPr>
                 <a:xfrm>
                   <a:off x="3286631" y="4915605"/>
-                  <a:ext cx="913020" cy="558514"/>
+                  <a:ext cx="881965" cy="601681"/>
                 </a:xfrm>
                 <a:prstGeom prst="line">
                   <a:avLst/>
@@ -5139,7 +5139,7 @@
             </p:nvSpPr>
             <p:spPr>
               <a:xfrm>
-                <a:off x="3135935" y="4667477"/>
+                <a:off x="3142492" y="4633329"/>
                 <a:ext cx="250852" cy="250852"/>
               </a:xfrm>
               <a:prstGeom prst="ellipse">
@@ -45364,7 +45364,7 @@
         </p:nvSpPr>
         <p:spPr>
           <a:xfrm>
-            <a:off x="681733" y="1043126"/>
+            <a:off x="661855" y="1036500"/>
             <a:ext cx="8429625" cy="4455066"/>
           </a:xfrm>
           <a:prstGeom prst="rect">
@@ -46002,7 +46002,7 @@
         <p:spPr>
           <a:xfrm>
             <a:off x="7220064" y="1026375"/>
-            <a:ext cx="4001984" cy="1769715"/>
+            <a:ext cx="4001984" cy="1908215"/>
           </a:xfrm>
           <a:prstGeom prst="rect">
             <a:avLst/>
@@ -46039,6 +46039,13 @@
             <a:r>
               <a:rPr lang="en-US" sz="900" dirty="0"/>
               <a:t>Overtone Distribution</a:t>
+            </a:r>
+          </a:p>
+          <a:p>
+            <a:pPr lvl="2"/>
+            <a:r>
+              <a:rPr lang="en-US" sz="900" dirty="0"/>
+              <a:t>	</a:t>
             </a:r>
           </a:p>
           <a:p>
@@ -51222,7 +51229,7 @@
         </p:nvGrpSpPr>
         <p:grpSpPr>
           <a:xfrm>
-            <a:off x="8396704" y="1559731"/>
+            <a:off x="8396704" y="1565593"/>
             <a:ext cx="1779966" cy="1695206"/>
             <a:chOff x="1822063" y="3778963"/>
             <a:chExt cx="1972085" cy="1878176"/>

</xml_diff>